<commit_message>
Comprehensive revamp: Yahoo Finance-style UI with 8-slide IB-grade PPTX
Complete rewrite of all major files to transform the app from a sparse
3-slide Deal Score tool into a comprehensive company research platform:

- data_engine.py: Expanded CompanyData to 60+ fields (financials,
  ownership, analyst, ESG, insider transactions, 5Y price history).
  Removed Deal Score. Fixed news parsing for new yfinance format.
- ai_insights.py: Added M&A history, industry analysis, and risk
  factors via dedicated LLM calls with structured parsing.
- pptx_generator.py: 8-slide investment-banker-grade output with
  navy/gold palette, styled tables, embedded matplotlib charts.
- main.py: 14-section Yahoo Finance-style Streamlit dashboard with
  interactive Plotly charts, tabbed financials, analyst consensus.
- create_template.py: Simplified to blank landscape template.
- README.md: Updated to reflect new feature set.

Co-Authored-By: Claude Opus 4.5 <noreply@anthropic.com>
</commit_message>
<xml_diff>
--- a/assets/template.pptx
+++ b/assets/template.pptx
@@ -1402,7 +1402,7 @@
 
 <file path=ppt/slideLayouts/slideLayout5.xml><?xml version="1.0" encoding="utf-8"?>
 <p:sldLayout xmlns:a="http://schemas.openxmlformats.org/drawingml/2006/main" xmlns:r="http://schemas.openxmlformats.org/officeDocument/2006/relationships" xmlns:p="http://schemas.openxmlformats.org/presentationml/2006/main" type="twoTxTwoObj" preserve="1">
-  <p:cSld name="Strategy">
+  <p:cSld name="Comparison">
     <p:spTree>
       <p:nvGrpSpPr>
         <p:cNvPr id="1" name=""/>
@@ -1809,94 +1809,6 @@
           </a:p>
         </p:txBody>
       </p:sp>
-      <p:sp>
-        <p:nvSpPr>
-          <p:cNvPr id="230" name="Strat Title"/>
-          <p:cNvSpPr>
-            <a:spLocks noGrp="1"/>
-          </p:cNvSpPr>
-          <p:nvPr>
-            <p:ph idx="30"/>
-          </p:nvPr>
-        </p:nvSpPr>
-        <p:spPr>
-          <a:xfrm>
-            <a:off x="457200" y="274320"/>
-            <a:ext cx="10972800" cy="640080"/>
-          </a:xfrm>
-        </p:spPr>
-        <p:txBody>
-          <a:bodyPr wrap="square"/>
-          <a:lstStyle/>
-          <a:p/>
-        </p:txBody>
-      </p:sp>
-      <p:sp>
-        <p:nvSpPr>
-          <p:cNvPr id="231" name="Management"/>
-          <p:cNvSpPr>
-            <a:spLocks noGrp="1"/>
-          </p:cNvSpPr>
-          <p:nvPr>
-            <p:ph idx="31"/>
-          </p:nvPr>
-        </p:nvSpPr>
-        <p:spPr>
-          <a:xfrm>
-            <a:off x="457200" y="1188720"/>
-            <a:ext cx="5029200" cy="2286000"/>
-          </a:xfrm>
-        </p:spPr>
-        <p:txBody>
-          <a:bodyPr wrap="square"/>
-          <a:lstStyle/>
-          <a:p/>
-        </p:txBody>
-      </p:sp>
-      <p:sp>
-        <p:nvSpPr>
-          <p:cNvPr id="232" name="Segments Pie"/>
-          <p:cNvSpPr>
-            <a:spLocks noGrp="1"/>
-          </p:cNvSpPr>
-          <p:nvPr>
-            <p:ph idx="32"/>
-          </p:nvPr>
-        </p:nvSpPr>
-        <p:spPr>
-          <a:xfrm>
-            <a:off x="6400800" y="1188720"/>
-            <a:ext cx="5303520" cy="2743200"/>
-          </a:xfrm>
-        </p:spPr>
-        <p:txBody>
-          <a:bodyPr wrap="square"/>
-          <a:lstStyle/>
-          <a:p/>
-        </p:txBody>
-      </p:sp>
-      <p:sp>
-        <p:nvSpPr>
-          <p:cNvPr id="233" name="News"/>
-          <p:cNvSpPr>
-            <a:spLocks noGrp="1"/>
-          </p:cNvSpPr>
-          <p:nvPr>
-            <p:ph idx="33"/>
-          </p:nvPr>
-        </p:nvSpPr>
-        <p:spPr>
-          <a:xfrm>
-            <a:off x="457200" y="3840480"/>
-            <a:ext cx="10972800" cy="2743200"/>
-          </a:xfrm>
-        </p:spPr>
-        <p:txBody>
-          <a:bodyPr wrap="square"/>
-          <a:lstStyle/>
-          <a:p/>
-        </p:txBody>
-      </p:sp>
     </p:spTree>
     <p:extLst>
       <p:ext uri="{BB962C8B-B14F-4D97-AF65-F5344CB8AC3E}">
@@ -1912,7 +1824,7 @@
 
 <file path=ppt/slideLayouts/slideLayout6.xml><?xml version="1.0" encoding="utf-8"?>
 <p:sldLayout xmlns:a="http://schemas.openxmlformats.org/drawingml/2006/main" xmlns:r="http://schemas.openxmlformats.org/officeDocument/2006/relationships" xmlns:p="http://schemas.openxmlformats.org/presentationml/2006/main" type="titleOnly" preserve="1">
-  <p:cSld name="Financials">
+  <p:cSld name="Title Only">
     <p:spTree>
       <p:nvGrpSpPr>
         <p:cNvPr id="1" name=""/>
@@ -2013,94 +1925,6 @@
             </a:fld>
             <a:endParaRPr lang="en-US"/>
           </a:p>
-        </p:txBody>
-      </p:sp>
-      <p:sp>
-        <p:nvSpPr>
-          <p:cNvPr id="220" name="Fin Title"/>
-          <p:cNvSpPr>
-            <a:spLocks noGrp="1"/>
-          </p:cNvSpPr>
-          <p:nvPr>
-            <p:ph idx="20"/>
-          </p:nvPr>
-        </p:nvSpPr>
-        <p:spPr>
-          <a:xfrm>
-            <a:off x="457200" y="274320"/>
-            <a:ext cx="10972800" cy="640080"/>
-          </a:xfrm>
-        </p:spPr>
-        <p:txBody>
-          <a:bodyPr wrap="square"/>
-          <a:lstStyle/>
-          <a:p/>
-        </p:txBody>
-      </p:sp>
-      <p:sp>
-        <p:nvSpPr>
-          <p:cNvPr id="221" name="Fin Table"/>
-          <p:cNvSpPr>
-            <a:spLocks noGrp="1"/>
-          </p:cNvSpPr>
-          <p:nvPr>
-            <p:ph idx="21"/>
-          </p:nvPr>
-        </p:nvSpPr>
-        <p:spPr>
-          <a:xfrm>
-            <a:off x="457200" y="1188720"/>
-            <a:ext cx="5486400" cy="5029200"/>
-          </a:xfrm>
-        </p:spPr>
-        <p:txBody>
-          <a:bodyPr wrap="square"/>
-          <a:lstStyle/>
-          <a:p/>
-        </p:txBody>
-      </p:sp>
-      <p:sp>
-        <p:nvSpPr>
-          <p:cNvPr id="222" name="EBITDA Chart"/>
-          <p:cNvSpPr>
-            <a:spLocks noGrp="1"/>
-          </p:cNvSpPr>
-          <p:nvPr>
-            <p:ph idx="22"/>
-          </p:nvPr>
-        </p:nvSpPr>
-        <p:spPr>
-          <a:xfrm>
-            <a:off x="6400800" y="1188720"/>
-            <a:ext cx="5303520" cy="3200400"/>
-          </a:xfrm>
-        </p:spPr>
-        <p:txBody>
-          <a:bodyPr wrap="square"/>
-          <a:lstStyle/>
-          <a:p/>
-        </p:txBody>
-      </p:sp>
-      <p:sp>
-        <p:nvSpPr>
-          <p:cNvPr id="223" name="Deal Score"/>
-          <p:cNvSpPr>
-            <a:spLocks noGrp="1"/>
-          </p:cNvSpPr>
-          <p:nvPr>
-            <p:ph idx="23"/>
-          </p:nvPr>
-        </p:nvSpPr>
-        <p:spPr>
-          <a:xfrm>
-            <a:off x="6400800" y="4572000"/>
-            <a:ext cx="5303520" cy="1828800"/>
-          </a:xfrm>
-        </p:spPr>
-        <p:txBody>
-          <a:bodyPr wrap="square"/>
-          <a:lstStyle/>
-          <a:p/>
         </p:txBody>
       </p:sp>
     </p:spTree>
@@ -2118,7 +1942,7 @@
 
 <file path=ppt/slideLayouts/slideLayout7.xml><?xml version="1.0" encoding="utf-8"?>
 <p:sldLayout xmlns:a="http://schemas.openxmlformats.org/drawingml/2006/main" xmlns:r="http://schemas.openxmlformats.org/officeDocument/2006/relationships" xmlns:p="http://schemas.openxmlformats.org/presentationml/2006/main" type="blank" preserve="1">
-  <p:cSld name="Executive Summary">
+  <p:cSld name="Blank">
     <p:spTree>
       <p:nvGrpSpPr>
         <p:cNvPr id="1" name=""/>
@@ -2196,116 +2020,6 @@
             </a:fld>
             <a:endParaRPr lang="en-US"/>
           </a:p>
-        </p:txBody>
-      </p:sp>
-      <p:sp>
-        <p:nvSpPr>
-          <p:cNvPr id="210" name="Company Name"/>
-          <p:cNvSpPr>
-            <a:spLocks noGrp="1"/>
-          </p:cNvSpPr>
-          <p:nvPr>
-            <p:ph idx="10"/>
-          </p:nvPr>
-        </p:nvSpPr>
-        <p:spPr>
-          <a:xfrm>
-            <a:off x="457200" y="274320"/>
-            <a:ext cx="5486400" cy="640080"/>
-          </a:xfrm>
-        </p:spPr>
-        <p:txBody>
-          <a:bodyPr wrap="square"/>
-          <a:lstStyle/>
-          <a:p/>
-        </p:txBody>
-      </p:sp>
-      <p:sp>
-        <p:nvSpPr>
-          <p:cNvPr id="211" name="Ticker Price"/>
-          <p:cNvSpPr>
-            <a:spLocks noGrp="1"/>
-          </p:cNvSpPr>
-          <p:nvPr>
-            <p:ph idx="11"/>
-          </p:nvPr>
-        </p:nvSpPr>
-        <p:spPr>
-          <a:xfrm>
-            <a:off x="457200" y="914400"/>
-            <a:ext cx="5486400" cy="457200"/>
-          </a:xfrm>
-        </p:spPr>
-        <p:txBody>
-          <a:bodyPr wrap="square"/>
-          <a:lstStyle/>
-          <a:p/>
-        </p:txBody>
-      </p:sp>
-      <p:sp>
-        <p:nvSpPr>
-          <p:cNvPr id="212" name="Summary Bullets"/>
-          <p:cNvSpPr>
-            <a:spLocks noGrp="1"/>
-          </p:cNvSpPr>
-          <p:nvPr>
-            <p:ph idx="12"/>
-          </p:nvPr>
-        </p:nvSpPr>
-        <p:spPr>
-          <a:xfrm>
-            <a:off x="457200" y="1554480"/>
-            <a:ext cx="5029200" cy="4114800"/>
-          </a:xfrm>
-        </p:spPr>
-        <p:txBody>
-          <a:bodyPr wrap="square"/>
-          <a:lstStyle/>
-          <a:p/>
-        </p:txBody>
-      </p:sp>
-      <p:sp>
-        <p:nvSpPr>
-          <p:cNvPr id="213" name="Price Chart"/>
-          <p:cNvSpPr>
-            <a:spLocks noGrp="1"/>
-          </p:cNvSpPr>
-          <p:nvPr>
-            <p:ph idx="13"/>
-          </p:nvPr>
-        </p:nvSpPr>
-        <p:spPr>
-          <a:xfrm>
-            <a:off x="6217920" y="274320"/>
-            <a:ext cx="5486400" cy="3657600"/>
-          </a:xfrm>
-        </p:spPr>
-        <p:txBody>
-          <a:bodyPr wrap="square"/>
-          <a:lstStyle/>
-          <a:p/>
-        </p:txBody>
-      </p:sp>
-      <p:sp>
-        <p:nvSpPr>
-          <p:cNvPr id="214" name="Key Metrics"/>
-          <p:cNvSpPr>
-            <a:spLocks noGrp="1"/>
-          </p:cNvSpPr>
-          <p:nvPr>
-            <p:ph idx="14"/>
-          </p:nvPr>
-        </p:nvSpPr>
-        <p:spPr>
-          <a:xfrm>
-            <a:off x="6217920" y="4114800"/>
-            <a:ext cx="5486400" cy="2286000"/>
-          </a:xfrm>
-        </p:spPr>
-        <p:txBody>
-          <a:bodyPr wrap="square"/>
-          <a:lstStyle/>
-          <a:p/>
         </p:txBody>
       </p:sp>
     </p:spTree>

</xml_diff>